<commit_message>
Add final edits to Kiri edits, final draft shipped
</commit_message>
<xml_diff>
--- a/slides.pptx
+++ b/slides.pptx
@@ -110,7 +110,43 @@
   </p:defaultTextStyle>
   <p:extLst>
     <p:ext uri="{EFAFB233-063F-42B5-8137-9DF3F51BA10A}">
-      <p15:sldGuideLst xmlns:p15="http://schemas.microsoft.com/office/powerpoint/2012/main"/>
+      <p15:sldGuideLst xmlns:p15="http://schemas.microsoft.com/office/powerpoint/2012/main">
+        <p15:guide id="2" pos="360" userDrawn="1">
+          <p15:clr>
+            <a:srgbClr val="A4A3A4"/>
+          </p15:clr>
+        </p15:guide>
+        <p15:guide id="3" pos="2976" userDrawn="1">
+          <p15:clr>
+            <a:srgbClr val="A4A3A4"/>
+          </p15:clr>
+        </p15:guide>
+        <p15:guide id="4" orient="horz" pos="936" userDrawn="1">
+          <p15:clr>
+            <a:srgbClr val="A4A3A4"/>
+          </p15:clr>
+        </p15:guide>
+        <p15:guide id="5" orient="horz" pos="2064" userDrawn="1">
+          <p15:clr>
+            <a:srgbClr val="A4A3A4"/>
+          </p15:clr>
+        </p15:guide>
+        <p15:guide id="6" orient="horz" pos="3384" userDrawn="1">
+          <p15:clr>
+            <a:srgbClr val="A4A3A4"/>
+          </p15:clr>
+        </p15:guide>
+        <p15:guide id="7" orient="horz" pos="3888" userDrawn="1">
+          <p15:clr>
+            <a:srgbClr val="A4A3A4"/>
+          </p15:clr>
+        </p15:guide>
+        <p15:guide id="8" pos="2640" userDrawn="1">
+          <p15:clr>
+            <a:srgbClr val="A4A3A4"/>
+          </p15:clr>
+        </p15:guide>
+      </p15:sldGuideLst>
     </p:ext>
   </p:extLst>
 </p:presentation>
@@ -245,7 +281,7 @@
           <a:p>
             <a:fld id="{472417AA-5186-4DA5-8FC7-94E6CE6234FF}" type="datetimeFigureOut">
               <a:rPr lang="en-US" smtClean="0"/>
-              <a:t>10/15/21</a:t>
+              <a:t>10/18/21</a:t>
             </a:fld>
             <a:endParaRPr lang="en-US"/>
           </a:p>
@@ -413,7 +449,7 @@
           <a:p>
             <a:fld id="{472417AA-5186-4DA5-8FC7-94E6CE6234FF}" type="datetimeFigureOut">
               <a:rPr lang="en-US" smtClean="0"/>
-              <a:t>10/15/21</a:t>
+              <a:t>10/18/21</a:t>
             </a:fld>
             <a:endParaRPr lang="en-US"/>
           </a:p>
@@ -591,7 +627,7 @@
           <a:p>
             <a:fld id="{472417AA-5186-4DA5-8FC7-94E6CE6234FF}" type="datetimeFigureOut">
               <a:rPr lang="en-US" smtClean="0"/>
-              <a:t>10/15/21</a:t>
+              <a:t>10/18/21</a:t>
             </a:fld>
             <a:endParaRPr lang="en-US"/>
           </a:p>
@@ -759,7 +795,7 @@
           <a:p>
             <a:fld id="{472417AA-5186-4DA5-8FC7-94E6CE6234FF}" type="datetimeFigureOut">
               <a:rPr lang="en-US" smtClean="0"/>
-              <a:t>10/15/21</a:t>
+              <a:t>10/18/21</a:t>
             </a:fld>
             <a:endParaRPr lang="en-US"/>
           </a:p>
@@ -1004,7 +1040,7 @@
           <a:p>
             <a:fld id="{472417AA-5186-4DA5-8FC7-94E6CE6234FF}" type="datetimeFigureOut">
               <a:rPr lang="en-US" smtClean="0"/>
-              <a:t>10/15/21</a:t>
+              <a:t>10/18/21</a:t>
             </a:fld>
             <a:endParaRPr lang="en-US"/>
           </a:p>
@@ -1233,7 +1269,7 @@
           <a:p>
             <a:fld id="{472417AA-5186-4DA5-8FC7-94E6CE6234FF}" type="datetimeFigureOut">
               <a:rPr lang="en-US" smtClean="0"/>
-              <a:t>10/15/21</a:t>
+              <a:t>10/18/21</a:t>
             </a:fld>
             <a:endParaRPr lang="en-US"/>
           </a:p>
@@ -1597,7 +1633,7 @@
           <a:p>
             <a:fld id="{472417AA-5186-4DA5-8FC7-94E6CE6234FF}" type="datetimeFigureOut">
               <a:rPr lang="en-US" smtClean="0"/>
-              <a:t>10/15/21</a:t>
+              <a:t>10/18/21</a:t>
             </a:fld>
             <a:endParaRPr lang="en-US"/>
           </a:p>
@@ -1714,7 +1750,7 @@
           <a:p>
             <a:fld id="{472417AA-5186-4DA5-8FC7-94E6CE6234FF}" type="datetimeFigureOut">
               <a:rPr lang="en-US" smtClean="0"/>
-              <a:t>10/15/21</a:t>
+              <a:t>10/18/21</a:t>
             </a:fld>
             <a:endParaRPr lang="en-US"/>
           </a:p>
@@ -1809,7 +1845,7 @@
           <a:p>
             <a:fld id="{472417AA-5186-4DA5-8FC7-94E6CE6234FF}" type="datetimeFigureOut">
               <a:rPr lang="en-US" smtClean="0"/>
-              <a:t>10/15/21</a:t>
+              <a:t>10/18/21</a:t>
             </a:fld>
             <a:endParaRPr lang="en-US"/>
           </a:p>
@@ -2084,7 +2120,7 @@
           <a:p>
             <a:fld id="{472417AA-5186-4DA5-8FC7-94E6CE6234FF}" type="datetimeFigureOut">
               <a:rPr lang="en-US" smtClean="0"/>
-              <a:t>10/15/21</a:t>
+              <a:t>10/18/21</a:t>
             </a:fld>
             <a:endParaRPr lang="en-US"/>
           </a:p>
@@ -2336,7 +2372,7 @@
           <a:p>
             <a:fld id="{472417AA-5186-4DA5-8FC7-94E6CE6234FF}" type="datetimeFigureOut">
               <a:rPr lang="en-US" smtClean="0"/>
-              <a:t>10/15/21</a:t>
+              <a:t>10/18/21</a:t>
             </a:fld>
             <a:endParaRPr lang="en-US"/>
           </a:p>
@@ -2547,7 +2583,7 @@
           <a:p>
             <a:fld id="{472417AA-5186-4DA5-8FC7-94E6CE6234FF}" type="datetimeFigureOut">
               <a:rPr lang="en-US" smtClean="0"/>
-              <a:t>10/15/21</a:t>
+              <a:t>10/18/21</a:t>
             </a:fld>
             <a:endParaRPr lang="en-US"/>
           </a:p>
@@ -2980,8 +3016,8 @@
         </p:nvSpPr>
         <p:spPr>
           <a:xfrm>
-            <a:off x="684974" y="1262767"/>
-            <a:ext cx="7220246" cy="1323439"/>
+            <a:off x="571500" y="1830050"/>
+            <a:ext cx="7141763" cy="1446550"/>
           </a:xfrm>
           <a:prstGeom prst="rect">
             <a:avLst/>
@@ -2995,18 +3031,18 @@
           <a:lstStyle/>
           <a:p>
             <a:r>
-              <a:rPr lang="en-US" sz="4000" b="1" dirty="0">
+              <a:rPr lang="en-US" sz="4400" b="1" dirty="0">
                 <a:solidFill>
                   <a:schemeClr val="bg1"/>
                 </a:solidFill>
                 <a:latin typeface="Avenir Next Demi Bold" panose="020B0503020202020204" pitchFamily="34" charset="0"/>
               </a:rPr>
-              <a:t>Building capacity to provide</a:t>
-            </a:r>
-          </a:p>
-          <a:p>
-            <a:r>
-              <a:rPr lang="en-US" sz="4000" b="1" dirty="0">
+              <a:t>Building capacity to provide </a:t>
+            </a:r>
+          </a:p>
+          <a:p>
+            <a:r>
+              <a:rPr lang="en-US" sz="4400" b="1" dirty="0">
                 <a:solidFill>
                   <a:schemeClr val="bg1"/>
                 </a:solidFill>
@@ -3031,8 +3067,8 @@
         </p:nvSpPr>
         <p:spPr>
           <a:xfrm>
-            <a:off x="9139842" y="3806464"/>
-            <a:ext cx="2154051" cy="1569660"/>
+            <a:off x="571500" y="3310558"/>
+            <a:ext cx="1639551" cy="1323439"/>
           </a:xfrm>
           <a:prstGeom prst="rect">
             <a:avLst/>
@@ -3045,97 +3081,48 @@
           </a:bodyPr>
           <a:lstStyle/>
           <a:p>
-            <a:pPr algn="r"/>
-            <a:r>
-              <a:rPr lang="en-US" sz="2400" dirty="0">
+            <a:r>
+              <a:rPr lang="en-US" sz="2000" dirty="0">
                 <a:solidFill>
                   <a:schemeClr val="bg1"/>
                 </a:solidFill>
                 <a:latin typeface="Avenir Next Medium" panose="020B0503020202020204" pitchFamily="34" charset="0"/>
               </a:rPr>
-              <a:t>Kirsten </a:t>
-            </a:r>
-            <a:r>
-              <a:rPr lang="en-US" sz="2400" dirty="0" err="1">
+              <a:t>Kirsten Burcat</a:t>
+            </a:r>
+          </a:p>
+          <a:p>
+            <a:r>
+              <a:rPr lang="en-US" sz="2000" dirty="0">
                 <a:solidFill>
                   <a:schemeClr val="bg1"/>
                 </a:solidFill>
                 <a:latin typeface="Avenir Next Medium" panose="020B0503020202020204" pitchFamily="34" charset="0"/>
               </a:rPr>
-              <a:t>Burcat</a:t>
-            </a:r>
-            <a:endParaRPr lang="en-US" sz="2400" dirty="0">
-              <a:solidFill>
-                <a:schemeClr val="bg1"/>
-              </a:solidFill>
-              <a:latin typeface="Avenir Next Medium" panose="020B0503020202020204" pitchFamily="34" charset="0"/>
-            </a:endParaRPr>
-          </a:p>
-          <a:p>
-            <a:pPr algn="r"/>
-            <a:r>
-              <a:rPr lang="en-US" sz="2400" dirty="0">
+              <a:t>JP Courneya</a:t>
+            </a:r>
+          </a:p>
+          <a:p>
+            <a:r>
+              <a:rPr lang="en-US" sz="2000" dirty="0">
                 <a:solidFill>
                   <a:schemeClr val="bg1"/>
                 </a:solidFill>
                 <a:latin typeface="Avenir Next Medium" panose="020B0503020202020204" pitchFamily="34" charset="0"/>
               </a:rPr>
-              <a:t>JP </a:t>
-            </a:r>
-            <a:r>
-              <a:rPr lang="en-US" sz="2400" dirty="0" err="1">
+              <a:t>Amy Yarnell</a:t>
+            </a:r>
+          </a:p>
+          <a:p>
+            <a:r>
+              <a:rPr lang="en-US" sz="2000" dirty="0">
                 <a:solidFill>
                   <a:schemeClr val="bg1"/>
                 </a:solidFill>
                 <a:latin typeface="Avenir Next Medium" panose="020B0503020202020204" pitchFamily="34" charset="0"/>
               </a:rPr>
-              <a:t>Courneya</a:t>
-            </a:r>
-            <a:endParaRPr lang="en-US" sz="2400" dirty="0">
-              <a:solidFill>
-                <a:schemeClr val="bg1"/>
-              </a:solidFill>
-              <a:latin typeface="Avenir Next Medium" panose="020B0503020202020204" pitchFamily="34" charset="0"/>
-            </a:endParaRPr>
-          </a:p>
-          <a:p>
-            <a:pPr algn="r"/>
-            <a:r>
-              <a:rPr lang="en-US" sz="2400" dirty="0">
-                <a:solidFill>
-                  <a:schemeClr val="bg1"/>
-                </a:solidFill>
-                <a:latin typeface="Avenir Next Medium" panose="020B0503020202020204" pitchFamily="34" charset="0"/>
-              </a:rPr>
-              <a:t>Amy Yarnell</a:t>
-            </a:r>
-          </a:p>
-          <a:p>
-            <a:pPr algn="r"/>
-            <a:r>
-              <a:rPr lang="en-US" sz="2400" dirty="0">
-                <a:solidFill>
-                  <a:schemeClr val="bg1"/>
-                </a:solidFill>
-                <a:latin typeface="Avenir Next Medium" panose="020B0503020202020204" pitchFamily="34" charset="0"/>
-              </a:rPr>
-              <a:t>Brian </a:t>
-            </a:r>
-            <a:r>
-              <a:rPr lang="en-US" sz="2400" dirty="0" err="1">
-                <a:solidFill>
-                  <a:schemeClr val="bg1"/>
-                </a:solidFill>
-                <a:latin typeface="Avenir Next Medium" panose="020B0503020202020204" pitchFamily="34" charset="0"/>
-              </a:rPr>
-              <a:t>Zelip</a:t>
-            </a:r>
-            <a:endParaRPr lang="en-US" sz="2400" dirty="0">
-              <a:solidFill>
-                <a:schemeClr val="bg1"/>
-              </a:solidFill>
-              <a:latin typeface="Avenir Next Medium" panose="020B0503020202020204" pitchFamily="34" charset="0"/>
-            </a:endParaRPr>
+              <a:t>Brian Zelip</a:t>
+            </a:r>
           </a:p>
         </p:txBody>
       </p:sp>
@@ -3179,6 +3166,42 @@
           </a:p>
         </p:txBody>
       </p:sp>
+      <p:pic>
+        <p:nvPicPr>
+          <p:cNvPr id="6" name="Picture 5" descr="Logo, company name&#10;&#10;Description automatically generated">
+            <a:extLst>
+              <a:ext uri="{FF2B5EF4-FFF2-40B4-BE49-F238E27FC236}">
+                <a16:creationId xmlns:a16="http://schemas.microsoft.com/office/drawing/2014/main" id="{4C26C360-2A9D-4B1F-BB2F-43FCF6067FFF}"/>
+              </a:ext>
+            </a:extLst>
+          </p:cNvPr>
+          <p:cNvPicPr>
+            <a:picLocks noChangeAspect="1"/>
+          </p:cNvPicPr>
+          <p:nvPr/>
+        </p:nvPicPr>
+        <p:blipFill>
+          <a:blip r:embed="rId3" cstate="print">
+            <a:extLst>
+              <a:ext uri="{28A0092B-C50C-407E-A947-70E740481C1C}">
+                <a14:useLocalDpi xmlns:a14="http://schemas.microsoft.com/office/drawing/2010/main" val="0"/>
+              </a:ext>
+            </a:extLst>
+          </a:blip>
+          <a:stretch>
+            <a:fillRect/>
+          </a:stretch>
+        </p:blipFill>
+        <p:spPr>
+          <a:xfrm>
+            <a:off x="4296014" y="5405350"/>
+            <a:ext cx="5396628" cy="865849"/>
+          </a:xfrm>
+          <a:prstGeom prst="rect">
+            <a:avLst/>
+          </a:prstGeom>
+        </p:spPr>
+      </p:pic>
     </p:spTree>
     <p:extLst>
       <p:ext uri="{BB962C8B-B14F-4D97-AF65-F5344CB8AC3E}">
@@ -3237,7 +3260,7 @@
         </p:nvSpPr>
         <p:spPr>
           <a:xfrm>
-            <a:off x="689344" y="170366"/>
+            <a:off x="678055" y="791485"/>
             <a:ext cx="6285119" cy="923330"/>
           </a:xfrm>
           <a:prstGeom prst="rect">
@@ -3277,8 +3300,8 @@
         </p:nvSpPr>
         <p:spPr>
           <a:xfrm>
-            <a:off x="689344" y="1423681"/>
-            <a:ext cx="10813312" cy="1938992"/>
+            <a:off x="678055" y="1705957"/>
+            <a:ext cx="10813312" cy="1323439"/>
           </a:xfrm>
           <a:prstGeom prst="rect">
             <a:avLst/>
@@ -3320,7 +3343,160 @@
               <a:t>Library Carpentry (LC) is a subset of the Carpentries curriculum directed library staff.</a:t>
             </a:r>
           </a:p>
-          <a:p>
+        </p:txBody>
+      </p:sp>
+      <p:sp>
+        <p:nvSpPr>
+          <p:cNvPr id="6" name="TextBox 5">
+            <a:extLst>
+              <a:ext uri="{FF2B5EF4-FFF2-40B4-BE49-F238E27FC236}">
+                <a16:creationId xmlns:a16="http://schemas.microsoft.com/office/drawing/2014/main" id="{364727F2-CA19-4EE6-8AEA-C4E2A0CE89BB}"/>
+              </a:ext>
+            </a:extLst>
+          </p:cNvPr>
+          <p:cNvSpPr txBox="1"/>
+          <p:nvPr/>
+        </p:nvSpPr>
+        <p:spPr>
+          <a:xfrm>
+            <a:off x="689344" y="3184519"/>
+            <a:ext cx="4054781" cy="1692771"/>
+          </a:xfrm>
+          <a:prstGeom prst="rect">
+            <a:avLst/>
+          </a:prstGeom>
+          <a:noFill/>
+        </p:spPr>
+        <p:txBody>
+          <a:bodyPr wrap="square" rtlCol="0">
+            <a:spAutoFit/>
+          </a:bodyPr>
+          <a:lstStyle/>
+          <a:p>
+            <a:r>
+              <a:rPr lang="en-US" sz="2000" dirty="0">
+                <a:solidFill>
+                  <a:schemeClr val="bg1"/>
+                </a:solidFill>
+                <a:latin typeface="Avenir Next" panose="020B0503020202020204" pitchFamily="34" charset="0"/>
+              </a:rPr>
+              <a:t>A Standard Workshop</a:t>
+            </a:r>
+          </a:p>
+          <a:p>
+            <a:pPr indent="-342900">
+              <a:buFont typeface="Arial" panose="020B0604020202020204" pitchFamily="34" charset="0"/>
+              <a:buChar char="•"/>
+            </a:pPr>
+            <a:r>
+              <a:rPr lang="en-US" sz="2000" dirty="0">
+                <a:solidFill>
+                  <a:schemeClr val="bg1"/>
+                </a:solidFill>
+                <a:latin typeface="Avenir Next" panose="020B0503020202020204" pitchFamily="34" charset="0"/>
+              </a:rPr>
+              <a:t>2 days long, ~7 hrs/day</a:t>
+            </a:r>
+          </a:p>
+          <a:p>
+            <a:pPr indent="-342900">
+              <a:buFont typeface="Arial" panose="020B0604020202020204" pitchFamily="34" charset="0"/>
+              <a:buChar char="•"/>
+            </a:pPr>
+            <a:r>
+              <a:rPr lang="en-US" sz="2000" dirty="0">
+                <a:solidFill>
+                  <a:schemeClr val="bg1"/>
+                </a:solidFill>
+                <a:latin typeface="Avenir Next" panose="020B0503020202020204" pitchFamily="34" charset="0"/>
+              </a:rPr>
+              <a:t>Breaks and group discussion</a:t>
+            </a:r>
+          </a:p>
+          <a:p>
+            <a:pPr indent="-342900">
+              <a:buFont typeface="Arial" panose="020B0604020202020204" pitchFamily="34" charset="0"/>
+              <a:buChar char="•"/>
+            </a:pPr>
+            <a:r>
+              <a:rPr lang="en-US" sz="2000" dirty="0">
+                <a:solidFill>
+                  <a:schemeClr val="bg1"/>
+                </a:solidFill>
+                <a:latin typeface="Avenir Next" panose="020B0503020202020204" pitchFamily="34" charset="0"/>
+              </a:rPr>
+              <a:t>In-person (pre-COVID)</a:t>
+            </a:r>
+          </a:p>
+          <a:p>
+            <a:pPr indent="-342900">
+              <a:buFont typeface="Arial" panose="020B0604020202020204" pitchFamily="34" charset="0"/>
+              <a:buChar char="•"/>
+            </a:pPr>
+            <a:r>
+              <a:rPr lang="en-US" sz="2000" dirty="0">
+                <a:solidFill>
+                  <a:schemeClr val="bg1"/>
+                </a:solidFill>
+                <a:latin typeface="Avenir Next" panose="020B0503020202020204" pitchFamily="34" charset="0"/>
+              </a:rPr>
+              <a:t>Zoom (now)</a:t>
+            </a:r>
+          </a:p>
+        </p:txBody>
+      </p:sp>
+      <p:sp>
+        <p:nvSpPr>
+          <p:cNvPr id="4" name="TextBox 3">
+            <a:extLst>
+              <a:ext uri="{FF2B5EF4-FFF2-40B4-BE49-F238E27FC236}">
+                <a16:creationId xmlns:a16="http://schemas.microsoft.com/office/drawing/2014/main" id="{90C4276A-B4AB-4FFD-A8FB-DC4E4920420A}"/>
+              </a:ext>
+            </a:extLst>
+          </p:cNvPr>
+          <p:cNvSpPr txBox="1"/>
+          <p:nvPr/>
+        </p:nvSpPr>
+        <p:spPr>
+          <a:xfrm>
+            <a:off x="4947072" y="3184519"/>
+            <a:ext cx="7244928" cy="1908215"/>
+          </a:xfrm>
+          <a:prstGeom prst="rect">
+            <a:avLst/>
+          </a:prstGeom>
+          <a:noFill/>
+        </p:spPr>
+        <p:txBody>
+          <a:bodyPr wrap="square" rtlCol="0">
+            <a:spAutoFit/>
+          </a:bodyPr>
+          <a:lstStyle/>
+          <a:p>
+            <a:r>
+              <a:rPr lang="en-US" sz="2000" dirty="0">
+                <a:solidFill>
+                  <a:schemeClr val="bg1"/>
+                </a:solidFill>
+                <a:latin typeface="Avenir Next" panose="020B0503020202020204" pitchFamily="34" charset="0"/>
+              </a:rPr>
+              <a:t>Lessons</a:t>
+            </a:r>
+          </a:p>
+          <a:p>
+            <a:pPr indent="-285750">
+              <a:buFont typeface="Arial" panose="020B0604020202020204" pitchFamily="34" charset="0"/>
+              <a:buChar char="•"/>
+            </a:pPr>
+            <a:r>
+              <a:rPr lang="en-US" sz="2000" dirty="0" err="1">
+                <a:solidFill>
+                  <a:schemeClr val="bg1"/>
+                </a:solidFill>
+                <a:latin typeface="Avenir Next" panose="020B0503020202020204" pitchFamily="34" charset="0"/>
+              </a:rPr>
+              <a:t>Github</a:t>
+            </a:r>
             <a:endParaRPr lang="en-US" sz="2000" dirty="0">
               <a:solidFill>
                 <a:schemeClr val="bg1"/>
@@ -3329,123 +3505,20 @@
             </a:endParaRPr>
           </a:p>
           <a:p>
-            <a:r>
-              <a:rPr lang="en-US" sz="2000" dirty="0">
-                <a:solidFill>
-                  <a:schemeClr val="bg1"/>
-                </a:solidFill>
-                <a:latin typeface="Avenir Next" panose="020B0503020202020204" pitchFamily="34" charset="0"/>
-              </a:rPr>
-              <a:t>A common LC workshop</a:t>
-            </a:r>
-          </a:p>
-        </p:txBody>
-      </p:sp>
-      <p:sp>
-        <p:nvSpPr>
-          <p:cNvPr id="5" name="TextBox 4"/>
-          <p:cNvSpPr txBox="1"/>
-          <p:nvPr/>
-        </p:nvSpPr>
-        <p:spPr>
-          <a:xfrm>
-            <a:off x="689344" y="3362673"/>
-            <a:ext cx="10016359" cy="2585323"/>
-          </a:xfrm>
-          <a:prstGeom prst="rect">
-            <a:avLst/>
-          </a:prstGeom>
-          <a:noFill/>
-        </p:spPr>
-        <p:txBody>
-          <a:bodyPr wrap="square" numCol="2" rtlCol="0">
-            <a:spAutoFit/>
-          </a:bodyPr>
-          <a:lstStyle/>
-          <a:p>
-            <a:pPr marL="342900" indent="-342900">
+            <a:pPr indent="-285750">
               <a:buFont typeface="Arial" panose="020B0604020202020204" pitchFamily="34" charset="0"/>
               <a:buChar char="•"/>
             </a:pPr>
             <a:r>
-              <a:rPr lang="en-US" dirty="0">
+              <a:rPr lang="en-US" sz="2000" dirty="0" err="1">
                 <a:solidFill>
                   <a:schemeClr val="bg1"/>
                 </a:solidFill>
                 <a:latin typeface="Avenir Next" panose="020B0503020202020204" pitchFamily="34" charset="0"/>
               </a:rPr>
-              <a:t>2 days long, ~7hrs/day</a:t>
-            </a:r>
-          </a:p>
-          <a:p>
-            <a:pPr marL="342900" indent="-342900">
-              <a:buFont typeface="Arial" panose="020B0604020202020204" pitchFamily="34" charset="0"/>
-              <a:buChar char="•"/>
-            </a:pPr>
-            <a:r>
-              <a:rPr lang="en-US" dirty="0">
-                <a:solidFill>
-                  <a:schemeClr val="bg1"/>
-                </a:solidFill>
-                <a:latin typeface="Avenir Next" panose="020B0503020202020204" pitchFamily="34" charset="0"/>
-              </a:rPr>
-              <a:t>Plenty of breaks and group discussion</a:t>
-            </a:r>
-          </a:p>
-          <a:p>
-            <a:pPr marL="342900" indent="-342900">
-              <a:buFont typeface="Arial" panose="020B0604020202020204" pitchFamily="34" charset="0"/>
-              <a:buChar char="•"/>
-            </a:pPr>
-            <a:r>
-              <a:rPr lang="en-US" dirty="0">
-                <a:solidFill>
-                  <a:schemeClr val="bg1"/>
-                </a:solidFill>
-                <a:latin typeface="Avenir Next" panose="020B0503020202020204" pitchFamily="34" charset="0"/>
-              </a:rPr>
-              <a:t>In-person (pre-COVID)</a:t>
-            </a:r>
-          </a:p>
-          <a:p>
-            <a:pPr marL="342900" indent="-342900">
-              <a:buFont typeface="Arial" panose="020B0604020202020204" pitchFamily="34" charset="0"/>
-              <a:buChar char="•"/>
-            </a:pPr>
-            <a:r>
-              <a:rPr lang="en-US" dirty="0">
-                <a:solidFill>
-                  <a:schemeClr val="bg1"/>
-                </a:solidFill>
-                <a:latin typeface="Avenir Next" panose="020B0503020202020204" pitchFamily="34" charset="0"/>
-              </a:rPr>
-              <a:t>Zoom, </a:t>
-            </a:r>
-            <a:r>
-              <a:rPr lang="en-US" dirty="0" err="1">
-                <a:solidFill>
-                  <a:schemeClr val="bg1"/>
-                </a:solidFill>
-                <a:latin typeface="Avenir Next" panose="020B0503020202020204" pitchFamily="34" charset="0"/>
-              </a:rPr>
-              <a:t>etc</a:t>
-            </a:r>
-            <a:r>
-              <a:rPr lang="en-US" dirty="0">
-                <a:solidFill>
-                  <a:schemeClr val="bg1"/>
-                </a:solidFill>
-                <a:latin typeface="Avenir Next" panose="020B0503020202020204" pitchFamily="34" charset="0"/>
-              </a:rPr>
-              <a:t> (now)</a:t>
-            </a:r>
-          </a:p>
-          <a:p>
-            <a:pPr marL="342900" indent="-342900">
-              <a:buFont typeface="Arial" panose="020B0604020202020204" pitchFamily="34" charset="0"/>
-              <a:buChar char="•"/>
-            </a:pPr>
-            <a:endParaRPr lang="en-US" dirty="0">
+              <a:t>OpenRefine</a:t>
+            </a:r>
+            <a:endParaRPr lang="en-US" sz="2000" dirty="0">
               <a:solidFill>
                 <a:schemeClr val="bg1"/>
               </a:solidFill>
@@ -3453,157 +3526,41 @@
             </a:endParaRPr>
           </a:p>
           <a:p>
-            <a:pPr marL="342900" indent="-342900">
+            <a:pPr indent="-285750">
               <a:buFont typeface="Arial" panose="020B0604020202020204" pitchFamily="34" charset="0"/>
               <a:buChar char="•"/>
             </a:pPr>
-            <a:endParaRPr lang="en-US" dirty="0">
-              <a:solidFill>
-                <a:schemeClr val="bg1"/>
-              </a:solidFill>
-              <a:latin typeface="Avenir Next" panose="020B0503020202020204" pitchFamily="34" charset="0"/>
-            </a:endParaRPr>
-          </a:p>
-          <a:p>
-            <a:pPr marL="342900" indent="-342900">
+            <a:r>
+              <a:rPr lang="en-US" sz="2000" dirty="0">
+                <a:solidFill>
+                  <a:schemeClr val="bg1"/>
+                </a:solidFill>
+                <a:latin typeface="Avenir Next" panose="020B0503020202020204" pitchFamily="34" charset="0"/>
+              </a:rPr>
+              <a:t>The UNIX Shell</a:t>
+            </a:r>
+          </a:p>
+          <a:p>
+            <a:pPr indent="-285750">
               <a:buFont typeface="Arial" panose="020B0604020202020204" pitchFamily="34" charset="0"/>
               <a:buChar char="•"/>
             </a:pPr>
-            <a:endParaRPr lang="en-US" dirty="0">
-              <a:solidFill>
-                <a:schemeClr val="bg1"/>
-              </a:solidFill>
-              <a:latin typeface="Avenir Next" panose="020B0503020202020204" pitchFamily="34" charset="0"/>
-            </a:endParaRPr>
-          </a:p>
-          <a:p>
-            <a:pPr marL="342900" indent="-342900">
-              <a:buFont typeface="Arial" panose="020B0604020202020204" pitchFamily="34" charset="0"/>
-              <a:buChar char="•"/>
-            </a:pPr>
-            <a:endParaRPr lang="en-US" dirty="0">
-              <a:solidFill>
-                <a:schemeClr val="bg1"/>
-              </a:solidFill>
-              <a:latin typeface="Avenir Next" panose="020B0503020202020204" pitchFamily="34" charset="0"/>
-            </a:endParaRPr>
-          </a:p>
-          <a:p>
-            <a:pPr marL="342900" indent="-342900">
-              <a:buFont typeface="Arial" panose="020B0604020202020204" pitchFamily="34" charset="0"/>
-              <a:buChar char="•"/>
-            </a:pPr>
-            <a:endParaRPr lang="en-US" dirty="0">
-              <a:solidFill>
-                <a:schemeClr val="bg1"/>
-              </a:solidFill>
-              <a:latin typeface="Avenir Next" panose="020B0503020202020204" pitchFamily="34" charset="0"/>
-            </a:endParaRPr>
+            <a:r>
+              <a:rPr lang="en-US" sz="2000" dirty="0">
+                <a:solidFill>
+                  <a:schemeClr val="bg1"/>
+                </a:solidFill>
+                <a:latin typeface="Avenir Next" panose="020B0503020202020204" pitchFamily="34" charset="0"/>
+              </a:rPr>
+              <a:t>Working with data and regular expressions</a:t>
+            </a:r>
           </a:p>
           <a:p>
             <a:pPr marL="285750" indent="-285750">
               <a:buFont typeface="Arial" panose="020B0604020202020204" pitchFamily="34" charset="0"/>
               <a:buChar char="•"/>
             </a:pPr>
-            <a:r>
-              <a:rPr lang="en-US" dirty="0">
-                <a:solidFill>
-                  <a:schemeClr val="bg1"/>
-                </a:solidFill>
-                <a:latin typeface="Avenir Next" panose="020B0503020202020204" pitchFamily="34" charset="0"/>
-              </a:rPr>
-              <a:t>Lessons</a:t>
-            </a:r>
-          </a:p>
-          <a:p>
-            <a:pPr marL="742950" lvl="1" indent="-285750">
-              <a:buFont typeface="Arial" panose="020B0604020202020204" pitchFamily="34" charset="0"/>
-              <a:buChar char="•"/>
-            </a:pPr>
-            <a:r>
-              <a:rPr lang="en-US" dirty="0">
-                <a:solidFill>
-                  <a:schemeClr val="bg1"/>
-                </a:solidFill>
-                <a:latin typeface="Avenir Next" panose="020B0503020202020204" pitchFamily="34" charset="0"/>
-              </a:rPr>
-              <a:t>Introduction to </a:t>
-            </a:r>
-            <a:r>
-              <a:rPr lang="en-US" dirty="0" err="1">
-                <a:solidFill>
-                  <a:schemeClr val="bg1"/>
-                </a:solidFill>
-                <a:latin typeface="Avenir Next" panose="020B0503020202020204" pitchFamily="34" charset="0"/>
-              </a:rPr>
-              <a:t>Github</a:t>
-            </a:r>
-            <a:endParaRPr lang="en-US" dirty="0">
-              <a:solidFill>
-                <a:schemeClr val="bg1"/>
-              </a:solidFill>
-              <a:latin typeface="Avenir Next" panose="020B0503020202020204" pitchFamily="34" charset="0"/>
-            </a:endParaRPr>
-          </a:p>
-          <a:p>
-            <a:pPr marL="742950" lvl="1" indent="-285750">
-              <a:buFont typeface="Arial" panose="020B0604020202020204" pitchFamily="34" charset="0"/>
-              <a:buChar char="•"/>
-            </a:pPr>
-            <a:r>
-              <a:rPr lang="en-US" dirty="0">
-                <a:solidFill>
-                  <a:schemeClr val="bg1"/>
-                </a:solidFill>
-                <a:latin typeface="Avenir Next" panose="020B0503020202020204" pitchFamily="34" charset="0"/>
-              </a:rPr>
-              <a:t>Introduction to </a:t>
-            </a:r>
-            <a:r>
-              <a:rPr lang="en-US" dirty="0" err="1">
-                <a:solidFill>
-                  <a:schemeClr val="bg1"/>
-                </a:solidFill>
-                <a:latin typeface="Avenir Next" panose="020B0503020202020204" pitchFamily="34" charset="0"/>
-              </a:rPr>
-              <a:t>OpenRefine</a:t>
-            </a:r>
-            <a:endParaRPr lang="en-US" dirty="0">
-              <a:solidFill>
-                <a:schemeClr val="bg1"/>
-              </a:solidFill>
-              <a:latin typeface="Avenir Next" panose="020B0503020202020204" pitchFamily="34" charset="0"/>
-            </a:endParaRPr>
-          </a:p>
-          <a:p>
-            <a:pPr marL="742950" lvl="1" indent="-285750">
-              <a:buFont typeface="Arial" panose="020B0604020202020204" pitchFamily="34" charset="0"/>
-              <a:buChar char="•"/>
-            </a:pPr>
-            <a:r>
-              <a:rPr lang="en-US" dirty="0">
-                <a:solidFill>
-                  <a:schemeClr val="bg1"/>
-                </a:solidFill>
-                <a:latin typeface="Avenir Next" panose="020B0503020202020204" pitchFamily="34" charset="0"/>
-              </a:rPr>
-              <a:t>The UNIX Shell</a:t>
-            </a:r>
-          </a:p>
-          <a:p>
-            <a:pPr marL="742950" lvl="1" indent="-285750">
-              <a:buFont typeface="Arial" panose="020B0604020202020204" pitchFamily="34" charset="0"/>
-              <a:buChar char="•"/>
-            </a:pPr>
-            <a:r>
-              <a:rPr lang="en-US" dirty="0">
-                <a:solidFill>
-                  <a:schemeClr val="bg1"/>
-                </a:solidFill>
-                <a:latin typeface="Avenir Next" panose="020B0503020202020204" pitchFamily="34" charset="0"/>
-              </a:rPr>
-              <a:t>Introduction to working with data and Regular Expressions</a:t>
-            </a:r>
+            <a:endParaRPr lang="en-US" dirty="0"/>
           </a:p>
         </p:txBody>
       </p:sp>
@@ -3705,8 +3662,8 @@
         </p:nvSpPr>
         <p:spPr>
           <a:xfrm>
-            <a:off x="689344" y="1296085"/>
-            <a:ext cx="10813312" cy="3785652"/>
+            <a:off x="4651024" y="1420262"/>
+            <a:ext cx="7314478" cy="3785652"/>
           </a:xfrm>
           <a:prstGeom prst="rect">
             <a:avLst/>
@@ -3719,6 +3676,17 @@
           </a:bodyPr>
           <a:lstStyle/>
           <a:p>
+            <a:r>
+              <a:rPr lang="en-US" sz="2000" dirty="0">
+                <a:solidFill>
+                  <a:schemeClr val="bg1"/>
+                </a:solidFill>
+                <a:latin typeface="Avenir Next" panose="020B0503020202020204" pitchFamily="34" charset="0"/>
+              </a:rPr>
+              <a:t>Logistics</a:t>
+            </a:r>
+          </a:p>
+          <a:p>
             <a:pPr marL="342900" indent="-342900">
               <a:buFont typeface="Arial" panose="020B0604020202020204" pitchFamily="34" charset="0"/>
               <a:buChar char="•"/>
@@ -3730,11 +3698,11 @@
                 </a:solidFill>
                 <a:latin typeface="Avenir Next" panose="020B0503020202020204" pitchFamily="34" charset="0"/>
               </a:rPr>
-              <a:t>Logistics</a:t>
-            </a:r>
-          </a:p>
-          <a:p>
-            <a:pPr marL="800100" lvl="1" indent="-342900">
+              <a:t>Change from in person to virtual</a:t>
+            </a:r>
+          </a:p>
+          <a:p>
+            <a:pPr marL="342900" indent="-342900">
               <a:buFont typeface="Arial" panose="020B0604020202020204" pitchFamily="34" charset="0"/>
               <a:buChar char="•"/>
             </a:pPr>
@@ -3745,44 +3713,11 @@
                 </a:solidFill>
                 <a:latin typeface="Avenir Next" panose="020B0503020202020204" pitchFamily="34" charset="0"/>
               </a:rPr>
-              <a:t>Change from in person to virtual (use of Zoom and </a:t>
-            </a:r>
-            <a:r>
-              <a:rPr lang="en-US" sz="2000" dirty="0" err="1">
-                <a:solidFill>
-                  <a:schemeClr val="bg1"/>
-                </a:solidFill>
-                <a:latin typeface="Avenir Next" panose="020B0503020202020204" pitchFamily="34" charset="0"/>
-              </a:rPr>
-              <a:t>Etherpad</a:t>
-            </a:r>
-            <a:r>
-              <a:rPr lang="en-US" sz="2000" dirty="0">
-                <a:solidFill>
-                  <a:schemeClr val="bg1"/>
-                </a:solidFill>
-                <a:latin typeface="Avenir Next" panose="020B0503020202020204" pitchFamily="34" charset="0"/>
-              </a:rPr>
-              <a:t>)</a:t>
-            </a:r>
-          </a:p>
-          <a:p>
-            <a:pPr marL="800100" lvl="1" indent="-342900">
-              <a:buFont typeface="Arial" panose="020B0604020202020204" pitchFamily="34" charset="0"/>
-              <a:buChar char="•"/>
-            </a:pPr>
-            <a:r>
-              <a:rPr lang="en-US" sz="2000" dirty="0">
-                <a:solidFill>
-                  <a:schemeClr val="bg1"/>
-                </a:solidFill>
-                <a:latin typeface="Avenir Next" panose="020B0503020202020204" pitchFamily="34" charset="0"/>
-              </a:rPr>
               <a:t>Central org helped with instructor recruitment</a:t>
             </a:r>
           </a:p>
           <a:p>
-            <a:pPr marL="800100" lvl="1" indent="-342900">
+            <a:pPr marL="342900" indent="-342900">
               <a:buFont typeface="Arial" panose="020B0604020202020204" pitchFamily="34" charset="0"/>
               <a:buChar char="•"/>
             </a:pPr>
@@ -3811,6 +3746,17 @@
             </a:endParaRPr>
           </a:p>
           <a:p>
+            <a:r>
+              <a:rPr lang="en-US" sz="2000" dirty="0">
+                <a:solidFill>
+                  <a:schemeClr val="bg1"/>
+                </a:solidFill>
+                <a:latin typeface="Avenir Next" panose="020B0503020202020204" pitchFamily="34" charset="0"/>
+              </a:rPr>
+              <a:t>Changes in second LC event</a:t>
+            </a:r>
+          </a:p>
+          <a:p>
             <a:pPr marL="342900" indent="-342900">
               <a:buFont typeface="Arial" panose="020B0604020202020204" pitchFamily="34" charset="0"/>
               <a:buChar char="•"/>
@@ -3822,26 +3768,11 @@
                 </a:solidFill>
                 <a:latin typeface="Avenir Next" panose="020B0503020202020204" pitchFamily="34" charset="0"/>
               </a:rPr>
-              <a:t>Changes in second LC event</a:t>
-            </a:r>
-          </a:p>
-          <a:p>
-            <a:pPr marL="800100" lvl="1" indent="-342900">
-              <a:buFont typeface="Arial" panose="020B0604020202020204" pitchFamily="34" charset="0"/>
-              <a:buChar char="•"/>
-            </a:pPr>
-            <a:r>
-              <a:rPr lang="en-US" sz="2000" dirty="0">
-                <a:solidFill>
-                  <a:schemeClr val="bg1"/>
-                </a:solidFill>
-                <a:latin typeface="Avenir Next" panose="020B0503020202020204" pitchFamily="34" charset="0"/>
-              </a:rPr>
               <a:t>Shorter duration</a:t>
             </a:r>
           </a:p>
           <a:p>
-            <a:pPr marL="800100" lvl="1" indent="-342900">
+            <a:pPr marL="342900" indent="-342900">
               <a:buFont typeface="Arial" panose="020B0604020202020204" pitchFamily="34" charset="0"/>
               <a:buChar char="•"/>
             </a:pPr>
@@ -3879,6 +3810,17 @@
             </a:endParaRPr>
           </a:p>
           <a:p>
+            <a:r>
+              <a:rPr lang="en-US" sz="2000" dirty="0">
+                <a:solidFill>
+                  <a:schemeClr val="bg1"/>
+                </a:solidFill>
+                <a:latin typeface="Avenir Next" panose="020B0503020202020204" pitchFamily="34" charset="0"/>
+              </a:rPr>
+              <a:t>Challenges</a:t>
+            </a:r>
+          </a:p>
+          <a:p>
             <a:pPr marL="342900" indent="-342900">
               <a:buFont typeface="Arial" panose="020B0604020202020204" pitchFamily="34" charset="0"/>
               <a:buChar char="•"/>
@@ -3890,26 +3832,11 @@
                 </a:solidFill>
                 <a:latin typeface="Avenir Next" panose="020B0503020202020204" pitchFamily="34" charset="0"/>
               </a:rPr>
-              <a:t>Challenges</a:t>
-            </a:r>
-          </a:p>
-          <a:p>
-            <a:pPr marL="800100" lvl="1" indent="-342900">
-              <a:buFont typeface="Arial" panose="020B0604020202020204" pitchFamily="34" charset="0"/>
-              <a:buChar char="•"/>
-            </a:pPr>
-            <a:r>
-              <a:rPr lang="en-US" sz="2000" dirty="0">
-                <a:solidFill>
-                  <a:schemeClr val="bg1"/>
-                </a:solidFill>
-                <a:latin typeface="Avenir Next" panose="020B0503020202020204" pitchFamily="34" charset="0"/>
-              </a:rPr>
               <a:t>Keeping everyone together in virtual environment</a:t>
             </a:r>
           </a:p>
           <a:p>
-            <a:pPr marL="800100" lvl="1" indent="-342900">
+            <a:pPr marL="342900" indent="-342900">
               <a:buFont typeface="Arial" panose="020B0604020202020204" pitchFamily="34" charset="0"/>
               <a:buChar char="•"/>
             </a:pPr>
@@ -3939,8 +3866,8 @@
         </p:nvSpPr>
         <p:spPr>
           <a:xfrm>
-            <a:off x="689344" y="170366"/>
-            <a:ext cx="7092006" cy="923330"/>
+            <a:off x="571500" y="1485900"/>
+            <a:ext cx="3939101" cy="2585323"/>
           </a:xfrm>
           <a:prstGeom prst="rect">
             <a:avLst/>
@@ -3948,7 +3875,7 @@
           <a:noFill/>
         </p:spPr>
         <p:txBody>
-          <a:bodyPr wrap="none" rtlCol="0">
+          <a:bodyPr wrap="square" rtlCol="0">
             <a:spAutoFit/>
           </a:bodyPr>
           <a:lstStyle/>
@@ -3960,7 +3887,29 @@
                 </a:solidFill>
                 <a:latin typeface="Avenir Next Demi Bold" panose="020B0503020202020204" pitchFamily="34" charset="0"/>
               </a:rPr>
-              <a:t>Hosting &amp; helping LC </a:t>
+              <a:t>Hosting </a:t>
+            </a:r>
+          </a:p>
+          <a:p>
+            <a:r>
+              <a:rPr lang="en-US" sz="5400" b="1" dirty="0">
+                <a:solidFill>
+                  <a:schemeClr val="bg1"/>
+                </a:solidFill>
+                <a:latin typeface="Avenir Next Demi Bold" panose="020B0503020202020204" pitchFamily="34" charset="0"/>
+              </a:rPr>
+              <a:t> &amp; </a:t>
+            </a:r>
+          </a:p>
+          <a:p>
+            <a:r>
+              <a:rPr lang="en-US" sz="5400" b="1" dirty="0">
+                <a:solidFill>
+                  <a:schemeClr val="bg1"/>
+                </a:solidFill>
+                <a:latin typeface="Avenir Next Demi Bold" panose="020B0503020202020204" pitchFamily="34" charset="0"/>
+              </a:rPr>
+              <a:t>Helping  </a:t>
             </a:r>
           </a:p>
         </p:txBody>
@@ -4063,8 +4012,8 @@
         </p:nvSpPr>
         <p:spPr>
           <a:xfrm>
-            <a:off x="689344" y="170366"/>
-            <a:ext cx="8677375" cy="923330"/>
+            <a:off x="571500" y="1485900"/>
+            <a:ext cx="4734278" cy="2585323"/>
           </a:xfrm>
           <a:prstGeom prst="rect">
             <a:avLst/>
@@ -4072,7 +4021,7 @@
           <a:noFill/>
         </p:spPr>
         <p:txBody>
-          <a:bodyPr wrap="none" rtlCol="0">
+          <a:bodyPr wrap="square" rtlCol="0">
             <a:spAutoFit/>
           </a:bodyPr>
           <a:lstStyle/>
@@ -4084,7 +4033,29 @@
                 </a:solidFill>
                 <a:latin typeface="Avenir Next Demi Bold" panose="020B0503020202020204" pitchFamily="34" charset="0"/>
               </a:rPr>
-              <a:t>Self-hosting &amp; teaching LC</a:t>
+              <a:t>Self-hosting </a:t>
+            </a:r>
+          </a:p>
+          <a:p>
+            <a:r>
+              <a:rPr lang="en-US" sz="5400" b="1" dirty="0">
+                <a:solidFill>
+                  <a:schemeClr val="bg1"/>
+                </a:solidFill>
+                <a:latin typeface="Avenir Next Demi Bold" panose="020B0503020202020204" pitchFamily="34" charset="0"/>
+              </a:rPr>
+              <a:t> &amp; </a:t>
+            </a:r>
+          </a:p>
+          <a:p>
+            <a:r>
+              <a:rPr lang="en-US" sz="5400" b="1" dirty="0">
+                <a:solidFill>
+                  <a:schemeClr val="bg1"/>
+                </a:solidFill>
+                <a:latin typeface="Avenir Next Demi Bold" panose="020B0503020202020204" pitchFamily="34" charset="0"/>
+              </a:rPr>
+              <a:t>Teaching </a:t>
             </a:r>
           </a:p>
         </p:txBody>
@@ -4143,8 +4114,8 @@
         </p:nvSpPr>
         <p:spPr>
           <a:xfrm>
-            <a:off x="689344" y="1591841"/>
-            <a:ext cx="10813312" cy="2862322"/>
+            <a:off x="4724400" y="1478952"/>
+            <a:ext cx="7267303" cy="3477875"/>
           </a:xfrm>
           <a:prstGeom prst="rect">
             <a:avLst/>
@@ -4168,128 +4139,155 @@
                 </a:solidFill>
                 <a:latin typeface="Avenir Next" panose="020B0503020202020204" pitchFamily="34" charset="0"/>
               </a:rPr>
-              <a:t>NNLM sponsored Carpentries Instructor training building its network of certified instructors and capacity to self-organize carpentries workshops. </a:t>
-            </a:r>
-          </a:p>
-          <a:p>
-            <a:pPr marL="342900" indent="-342900">
-              <a:buFont typeface="Arial" panose="020B0604020202020204" pitchFamily="34" charset="0"/>
-              <a:buChar char="•"/>
-            </a:pPr>
-            <a:r>
+              <a:t>NNLM sponsored national Carpentries Instructor training</a:t>
+            </a:r>
+            <a:br>
               <a:rPr lang="en-US" sz="2000" dirty="0">
                 <a:solidFill>
                   <a:schemeClr val="bg1"/>
                 </a:solidFill>
                 <a:latin typeface="Avenir Next" panose="020B0503020202020204" pitchFamily="34" charset="0"/>
               </a:rPr>
-              <a:t>HSHSL built its capacity with 3 in-house staff gaining LC instructor certification.</a:t>
-            </a:r>
-          </a:p>
-          <a:p>
-            <a:pPr marL="342900" indent="-342900">
-              <a:buFont typeface="Arial" panose="020B0604020202020204" pitchFamily="34" charset="0"/>
-              <a:buChar char="•"/>
-            </a:pPr>
-            <a:r>
-              <a:rPr lang="en-US" sz="2000" dirty="0">
-                <a:solidFill>
-                  <a:schemeClr val="bg1"/>
-                </a:solidFill>
-                <a:latin typeface="Avenir Next" panose="020B0503020202020204" pitchFamily="34" charset="0"/>
-              </a:rPr>
-              <a:t>More control over</a:t>
-            </a:r>
-          </a:p>
-          <a:p>
-            <a:pPr marL="800100" lvl="1" indent="-342900">
-              <a:buFont typeface="Arial" panose="020B0604020202020204" pitchFamily="34" charset="0"/>
-              <a:buChar char="•"/>
-            </a:pPr>
-            <a:r>
-              <a:rPr lang="en-US" sz="2000" dirty="0">
-                <a:solidFill>
-                  <a:schemeClr val="bg1"/>
-                </a:solidFill>
-                <a:latin typeface="Avenir Next" panose="020B0503020202020204" pitchFamily="34" charset="0"/>
-              </a:rPr>
-              <a:t>administrative timelines</a:t>
-            </a:r>
-          </a:p>
-          <a:p>
-            <a:pPr marL="800100" lvl="1" indent="-342900">
-              <a:buFont typeface="Arial" panose="020B0604020202020204" pitchFamily="34" charset="0"/>
-              <a:buChar char="•"/>
-            </a:pPr>
-            <a:r>
-              <a:rPr lang="en-US" sz="2000" dirty="0">
-                <a:solidFill>
-                  <a:schemeClr val="bg1"/>
-                </a:solidFill>
-                <a:latin typeface="Avenir Next" panose="020B0503020202020204" pitchFamily="34" charset="0"/>
-              </a:rPr>
-              <a:t>promotion timeline</a:t>
-            </a:r>
-          </a:p>
-          <a:p>
-            <a:pPr marL="800100" lvl="1" indent="-342900">
-              <a:buFont typeface="Arial" panose="020B0604020202020204" pitchFamily="34" charset="0"/>
-              <a:buChar char="•"/>
-            </a:pPr>
-            <a:r>
-              <a:rPr lang="en-US" sz="2000" dirty="0">
-                <a:solidFill>
-                  <a:schemeClr val="bg1"/>
-                </a:solidFill>
-                <a:latin typeface="Avenir Next" panose="020B0503020202020204" pitchFamily="34" charset="0"/>
-              </a:rPr>
-              <a:t>instructor buy-in</a:t>
-            </a:r>
-          </a:p>
-          <a:p>
-            <a:pPr marL="800100" lvl="1" indent="-342900">
-              <a:buFont typeface="Arial" panose="020B0604020202020204" pitchFamily="34" charset="0"/>
-              <a:buChar char="•"/>
-            </a:pPr>
-            <a:r>
-              <a:rPr lang="en-US" sz="2000" dirty="0">
-                <a:solidFill>
-                  <a:schemeClr val="bg1"/>
-                </a:solidFill>
-                <a:latin typeface="Avenir Next" panose="020B0503020202020204" pitchFamily="34" charset="0"/>
-              </a:rPr>
-              <a:t>curriculum </a:t>
-            </a:r>
-          </a:p>
-          <a:p>
-            <a:pPr marL="342900" indent="-342900">
-              <a:buFont typeface="Arial" panose="020B0604020202020204" pitchFamily="34" charset="0"/>
-              <a:buChar char="•"/>
-            </a:pPr>
-            <a:r>
-              <a:rPr lang="en-US" sz="2000" dirty="0">
-                <a:solidFill>
-                  <a:schemeClr val="bg1"/>
-                </a:solidFill>
-                <a:latin typeface="Avenir Next" panose="020B0503020202020204" pitchFamily="34" charset="0"/>
-              </a:rPr>
-              <a:t>No fee paid to the central </a:t>
-            </a:r>
-            <a:r>
-              <a:rPr lang="en-US" sz="2000">
-                <a:solidFill>
-                  <a:schemeClr val="bg1"/>
-                </a:solidFill>
-                <a:latin typeface="Avenir Next" panose="020B0503020202020204" pitchFamily="34" charset="0"/>
-              </a:rPr>
-              <a:t>Carpentries organization</a:t>
-            </a:r>
+            </a:br>
             <a:endParaRPr lang="en-US" sz="2000" dirty="0">
               <a:solidFill>
                 <a:schemeClr val="bg1"/>
               </a:solidFill>
               <a:latin typeface="Avenir Next" panose="020B0503020202020204" pitchFamily="34" charset="0"/>
             </a:endParaRPr>
+          </a:p>
+          <a:p>
+            <a:pPr marL="342900" indent="-342900">
+              <a:buFont typeface="Arial" panose="020B0604020202020204" pitchFamily="34" charset="0"/>
+              <a:buChar char="•"/>
+            </a:pPr>
+            <a:r>
+              <a:rPr lang="en-US" sz="2000" dirty="0">
+                <a:solidFill>
+                  <a:schemeClr val="bg1"/>
+                </a:solidFill>
+                <a:latin typeface="Avenir Next" panose="020B0503020202020204" pitchFamily="34" charset="0"/>
+              </a:rPr>
+              <a:t>3 HSHSL staff members certified Carpentries instructors</a:t>
+            </a:r>
+            <a:br>
+              <a:rPr lang="en-US" sz="2000" dirty="0">
+                <a:solidFill>
+                  <a:schemeClr val="bg1"/>
+                </a:solidFill>
+                <a:latin typeface="Avenir Next" panose="020B0503020202020204" pitchFamily="34" charset="0"/>
+              </a:rPr>
+            </a:br>
+            <a:endParaRPr lang="en-US" sz="2000" dirty="0">
+              <a:solidFill>
+                <a:schemeClr val="bg1"/>
+              </a:solidFill>
+              <a:latin typeface="Avenir Next" panose="020B0503020202020204" pitchFamily="34" charset="0"/>
+            </a:endParaRPr>
+          </a:p>
+          <a:p>
+            <a:pPr marL="342900" indent="-342900">
+              <a:buFont typeface="Arial" panose="020B0604020202020204" pitchFamily="34" charset="0"/>
+              <a:buChar char="•"/>
+            </a:pPr>
+            <a:r>
+              <a:rPr lang="en-US" sz="2000" dirty="0">
+                <a:solidFill>
+                  <a:schemeClr val="bg1"/>
+                </a:solidFill>
+                <a:latin typeface="Avenir Next" panose="020B0503020202020204" pitchFamily="34" charset="0"/>
+              </a:rPr>
+              <a:t>More control over</a:t>
+            </a:r>
+          </a:p>
+          <a:p>
+            <a:pPr marL="800100" lvl="1" indent="-342900">
+              <a:buFont typeface="Arial" panose="020B0604020202020204" pitchFamily="34" charset="0"/>
+              <a:buChar char="•"/>
+            </a:pPr>
+            <a:r>
+              <a:rPr lang="en-US" sz="2000" dirty="0">
+                <a:solidFill>
+                  <a:schemeClr val="bg1"/>
+                </a:solidFill>
+                <a:latin typeface="Avenir Next" panose="020B0503020202020204" pitchFamily="34" charset="0"/>
+              </a:rPr>
+              <a:t>administrative timelines</a:t>
+            </a:r>
+          </a:p>
+          <a:p>
+            <a:pPr marL="800100" lvl="1" indent="-342900">
+              <a:buFont typeface="Arial" panose="020B0604020202020204" pitchFamily="34" charset="0"/>
+              <a:buChar char="•"/>
+            </a:pPr>
+            <a:r>
+              <a:rPr lang="en-US" sz="2000" dirty="0">
+                <a:solidFill>
+                  <a:schemeClr val="bg1"/>
+                </a:solidFill>
+                <a:latin typeface="Avenir Next" panose="020B0503020202020204" pitchFamily="34" charset="0"/>
+              </a:rPr>
+              <a:t>promotion timeline</a:t>
+            </a:r>
+          </a:p>
+          <a:p>
+            <a:pPr marL="800100" lvl="1" indent="-342900">
+              <a:buFont typeface="Arial" panose="020B0604020202020204" pitchFamily="34" charset="0"/>
+              <a:buChar char="•"/>
+            </a:pPr>
+            <a:r>
+              <a:rPr lang="en-US" sz="2000" dirty="0">
+                <a:solidFill>
+                  <a:schemeClr val="bg1"/>
+                </a:solidFill>
+                <a:latin typeface="Avenir Next" panose="020B0503020202020204" pitchFamily="34" charset="0"/>
+              </a:rPr>
+              <a:t>instructor buy-in</a:t>
+            </a:r>
+          </a:p>
+          <a:p>
+            <a:pPr marL="800100" lvl="1" indent="-342900">
+              <a:buFont typeface="Arial" panose="020B0604020202020204" pitchFamily="34" charset="0"/>
+              <a:buChar char="•"/>
+            </a:pPr>
+            <a:r>
+              <a:rPr lang="en-US" sz="2000" dirty="0">
+                <a:solidFill>
+                  <a:schemeClr val="bg1"/>
+                </a:solidFill>
+                <a:latin typeface="Avenir Next" panose="020B0503020202020204" pitchFamily="34" charset="0"/>
+              </a:rPr>
+              <a:t>curriculum </a:t>
+            </a:r>
+            <a:br>
+              <a:rPr lang="en-US" sz="2000" dirty="0">
+                <a:solidFill>
+                  <a:schemeClr val="bg1"/>
+                </a:solidFill>
+                <a:latin typeface="Avenir Next" panose="020B0503020202020204" pitchFamily="34" charset="0"/>
+              </a:rPr>
+            </a:br>
+            <a:endParaRPr lang="en-US" sz="2000" dirty="0">
+              <a:solidFill>
+                <a:schemeClr val="bg1"/>
+              </a:solidFill>
+              <a:latin typeface="Avenir Next" panose="020B0503020202020204" pitchFamily="34" charset="0"/>
+            </a:endParaRPr>
+          </a:p>
+          <a:p>
+            <a:pPr marL="342900" indent="-342900">
+              <a:buFont typeface="Arial" panose="020B0604020202020204" pitchFamily="34" charset="0"/>
+              <a:buChar char="•"/>
+            </a:pPr>
+            <a:r>
+              <a:rPr lang="en-US" sz="2000" dirty="0">
+                <a:solidFill>
+                  <a:schemeClr val="bg1"/>
+                </a:solidFill>
+                <a:latin typeface="Avenir Next" panose="020B0503020202020204" pitchFamily="34" charset="0"/>
+              </a:rPr>
+              <a:t>No fee for Carpentries-organized workshop ($2500+)</a:t>
+            </a:r>
           </a:p>
         </p:txBody>
       </p:sp>
@@ -4351,8 +4349,8 @@
         </p:nvSpPr>
         <p:spPr>
           <a:xfrm>
-            <a:off x="684974" y="1262767"/>
-            <a:ext cx="2860078" cy="1323439"/>
+            <a:off x="571500" y="1513418"/>
+            <a:ext cx="2800831" cy="1446550"/>
           </a:xfrm>
           <a:prstGeom prst="rect">
             <a:avLst/>
@@ -4366,7 +4364,7 @@
           <a:lstStyle/>
           <a:p>
             <a:r>
-              <a:rPr lang="en-US" sz="4000" b="1" dirty="0">
+              <a:rPr lang="en-US" sz="4400" b="1" dirty="0">
                 <a:solidFill>
                   <a:schemeClr val="bg1"/>
                 </a:solidFill>
@@ -4377,53 +4375,13 @@
           </a:p>
           <a:p>
             <a:r>
-              <a:rPr lang="en-US" sz="4000" b="1" dirty="0">
+              <a:rPr lang="en-US" sz="4400" b="1" dirty="0">
                 <a:solidFill>
                   <a:schemeClr val="bg1"/>
                 </a:solidFill>
                 <a:latin typeface="Avenir Next Demi Bold" panose="020B0503020202020204" pitchFamily="34" charset="0"/>
               </a:rPr>
               <a:t>Questions?</a:t>
-            </a:r>
-          </a:p>
-        </p:txBody>
-      </p:sp>
-      <p:sp>
-        <p:nvSpPr>
-          <p:cNvPr id="3" name="TextBox 2">
-            <a:extLst>
-              <a:ext uri="{FF2B5EF4-FFF2-40B4-BE49-F238E27FC236}">
-                <a16:creationId xmlns:a16="http://schemas.microsoft.com/office/drawing/2014/main" id="{D1347224-7EF2-864B-851A-DE131E19ED82}"/>
-              </a:ext>
-            </a:extLst>
-          </p:cNvPr>
-          <p:cNvSpPr txBox="1"/>
-          <p:nvPr/>
-        </p:nvSpPr>
-        <p:spPr>
-          <a:xfrm>
-            <a:off x="4948865" y="4193597"/>
-            <a:ext cx="7157051" cy="1077218"/>
-          </a:xfrm>
-          <a:prstGeom prst="rect">
-            <a:avLst/>
-          </a:prstGeom>
-          <a:noFill/>
-        </p:spPr>
-        <p:txBody>
-          <a:bodyPr wrap="square" rtlCol="0">
-            <a:spAutoFit/>
-          </a:bodyPr>
-          <a:lstStyle/>
-          <a:p>
-            <a:r>
-              <a:rPr lang="en-US" sz="1600" i="1" dirty="0">
-                <a:solidFill>
-                  <a:schemeClr val="bg1"/>
-                </a:solidFill>
-                <a:latin typeface="Avenir Next" panose="020B0503020202020204" pitchFamily="34" charset="0"/>
-              </a:rPr>
-              <a:t>This project has been funded in whole or in part with Federal funds from the National Library of Medicine, National Institutes of Health, Department of Health and Human Services, under Cooperative Agreement Number UG4LM013724 with the University of Maryland, Baltimore.</a:t>
             </a:r>
           </a:p>
         </p:txBody>
@@ -4468,42 +4426,92 @@
           </a:p>
         </p:txBody>
       </p:sp>
-      <p:pic>
-        <p:nvPicPr>
-          <p:cNvPr id="8" name="Picture 7" descr="Text&#10;&#10;Description automatically generated">
+      <p:sp>
+        <p:nvSpPr>
+          <p:cNvPr id="3" name="TextBox 2">
             <a:extLst>
               <a:ext uri="{FF2B5EF4-FFF2-40B4-BE49-F238E27FC236}">
-                <a16:creationId xmlns:a16="http://schemas.microsoft.com/office/drawing/2014/main" id="{C3D42E1D-8509-A045-BDA1-1C6B42220E7E}"/>
+                <a16:creationId xmlns:a16="http://schemas.microsoft.com/office/drawing/2014/main" id="{D1347224-7EF2-864B-851A-DE131E19ED82}"/>
               </a:ext>
             </a:extLst>
           </p:cNvPr>
-          <p:cNvPicPr>
-            <a:picLocks noChangeAspect="1"/>
-          </p:cNvPicPr>
+          <p:cNvSpPr txBox="1"/>
           <p:nvPr/>
-        </p:nvPicPr>
-        <p:blipFill>
-          <a:blip r:embed="rId3" cstate="print">
-            <a:extLst>
-              <a:ext uri="{28A0092B-C50C-407E-A947-70E740481C1C}">
-                <a14:useLocalDpi xmlns:a14="http://schemas.microsoft.com/office/drawing/2010/main" val="0"/>
-              </a:ext>
-            </a:extLst>
-          </a:blip>
-          <a:stretch>
-            <a:fillRect/>
-          </a:stretch>
-        </p:blipFill>
+        </p:nvSpPr>
         <p:spPr>
           <a:xfrm>
-            <a:off x="5064778" y="3542467"/>
-            <a:ext cx="3802912" cy="610149"/>
+            <a:off x="4272845" y="5343744"/>
+            <a:ext cx="7885288" cy="830997"/>
           </a:xfrm>
           <a:prstGeom prst="rect">
             <a:avLst/>
           </a:prstGeom>
+          <a:noFill/>
         </p:spPr>
-      </p:pic>
+        <p:txBody>
+          <a:bodyPr wrap="square" rtlCol="0">
+            <a:spAutoFit/>
+          </a:bodyPr>
+          <a:lstStyle/>
+          <a:p>
+            <a:r>
+              <a:rPr lang="en-US" sz="1600" i="1" dirty="0">
+                <a:solidFill>
+                  <a:schemeClr val="bg1"/>
+                </a:solidFill>
+                <a:latin typeface="Avenir Next" panose="020B0503020202020204" pitchFamily="34" charset="0"/>
+              </a:rPr>
+              <a:t>This project has been funded in whole or in part with Federal funds from the National Library of Medicine, National Institutes of Health, Department of Health and Human Services, under Cooperative Agreement Number UG4LM013724 with the University of Maryland, Baltimore.</a:t>
+            </a:r>
+          </a:p>
+        </p:txBody>
+      </p:sp>
+      <p:cxnSp>
+        <p:nvCxnSpPr>
+          <p:cNvPr id="7" name="Straight Connector 6">
+            <a:extLst>
+              <a:ext uri="{FF2B5EF4-FFF2-40B4-BE49-F238E27FC236}">
+                <a16:creationId xmlns:a16="http://schemas.microsoft.com/office/drawing/2014/main" id="{AB2F8511-A72F-4836-BD8D-3E91F9C0CD4C}"/>
+              </a:ext>
+              <a:ext uri="{C183D7F6-B498-43B3-948B-1728B52AA6E4}">
+                <adec:decorative xmlns:adec="http://schemas.microsoft.com/office/drawing/2017/decorative" val="1"/>
+              </a:ext>
+            </a:extLst>
+          </p:cNvPr>
+          <p:cNvCxnSpPr>
+            <a:cxnSpLocks/>
+          </p:cNvCxnSpPr>
+          <p:nvPr/>
+        </p:nvCxnSpPr>
+        <p:spPr>
+          <a:xfrm>
+            <a:off x="4137378" y="5349656"/>
+            <a:ext cx="0" cy="778934"/>
+          </a:xfrm>
+          <a:prstGeom prst="line">
+            <a:avLst/>
+          </a:prstGeom>
+          <a:ln w="28575">
+            <a:solidFill>
+              <a:schemeClr val="bg1"/>
+            </a:solidFill>
+          </a:ln>
+        </p:spPr>
+        <p:style>
+          <a:lnRef idx="1">
+            <a:schemeClr val="accent1"/>
+          </a:lnRef>
+          <a:fillRef idx="0">
+            <a:schemeClr val="accent1"/>
+          </a:fillRef>
+          <a:effectRef idx="0">
+            <a:schemeClr val="accent1"/>
+          </a:effectRef>
+          <a:fontRef idx="minor">
+            <a:schemeClr val="tx1"/>
+          </a:fontRef>
+        </p:style>
+      </p:cxnSp>
     </p:spTree>
     <p:extLst>
       <p:ext uri="{BB962C8B-B14F-4D97-AF65-F5344CB8AC3E}">

</xml_diff>